<commit_message>
Updated students and sponsors
</commit_message>
<xml_diff>
--- a/sponsors/Sponsors.pptx
+++ b/sponsors/Sponsors.pptx
@@ -261,7 +261,7 @@
           <a:p>
             <a:fld id="{DEF9554B-B9F5-F54C-9585-F8785B6DBCA8}" type="datetimeFigureOut">
               <a:rPr lang="en-US" smtClean="0"/>
-              <a:t>3/3/23</a:t>
+              <a:t>3/6/23</a:t>
             </a:fld>
             <a:endParaRPr lang="en-US"/>
           </a:p>
@@ -459,7 +459,7 @@
           <a:p>
             <a:fld id="{DEF9554B-B9F5-F54C-9585-F8785B6DBCA8}" type="datetimeFigureOut">
               <a:rPr lang="en-US" smtClean="0"/>
-              <a:t>3/3/23</a:t>
+              <a:t>3/6/23</a:t>
             </a:fld>
             <a:endParaRPr lang="en-US"/>
           </a:p>
@@ -667,7 +667,7 @@
           <a:p>
             <a:fld id="{DEF9554B-B9F5-F54C-9585-F8785B6DBCA8}" type="datetimeFigureOut">
               <a:rPr lang="en-US" smtClean="0"/>
-              <a:t>3/3/23</a:t>
+              <a:t>3/6/23</a:t>
             </a:fld>
             <a:endParaRPr lang="en-US"/>
           </a:p>
@@ -865,7 +865,7 @@
           <a:p>
             <a:fld id="{DEF9554B-B9F5-F54C-9585-F8785B6DBCA8}" type="datetimeFigureOut">
               <a:rPr lang="en-US" smtClean="0"/>
-              <a:t>3/3/23</a:t>
+              <a:t>3/6/23</a:t>
             </a:fld>
             <a:endParaRPr lang="en-US"/>
           </a:p>
@@ -1140,7 +1140,7 @@
           <a:p>
             <a:fld id="{DEF9554B-B9F5-F54C-9585-F8785B6DBCA8}" type="datetimeFigureOut">
               <a:rPr lang="en-US" smtClean="0"/>
-              <a:t>3/3/23</a:t>
+              <a:t>3/6/23</a:t>
             </a:fld>
             <a:endParaRPr lang="en-US"/>
           </a:p>
@@ -1405,7 +1405,7 @@
           <a:p>
             <a:fld id="{DEF9554B-B9F5-F54C-9585-F8785B6DBCA8}" type="datetimeFigureOut">
               <a:rPr lang="en-US" smtClean="0"/>
-              <a:t>3/3/23</a:t>
+              <a:t>3/6/23</a:t>
             </a:fld>
             <a:endParaRPr lang="en-US"/>
           </a:p>
@@ -1817,7 +1817,7 @@
           <a:p>
             <a:fld id="{DEF9554B-B9F5-F54C-9585-F8785B6DBCA8}" type="datetimeFigureOut">
               <a:rPr lang="en-US" smtClean="0"/>
-              <a:t>3/3/23</a:t>
+              <a:t>3/6/23</a:t>
             </a:fld>
             <a:endParaRPr lang="en-US"/>
           </a:p>
@@ -1958,7 +1958,7 @@
           <a:p>
             <a:fld id="{DEF9554B-B9F5-F54C-9585-F8785B6DBCA8}" type="datetimeFigureOut">
               <a:rPr lang="en-US" smtClean="0"/>
-              <a:t>3/3/23</a:t>
+              <a:t>3/6/23</a:t>
             </a:fld>
             <a:endParaRPr lang="en-US"/>
           </a:p>
@@ -2071,7 +2071,7 @@
           <a:p>
             <a:fld id="{DEF9554B-B9F5-F54C-9585-F8785B6DBCA8}" type="datetimeFigureOut">
               <a:rPr lang="en-US" smtClean="0"/>
-              <a:t>3/3/23</a:t>
+              <a:t>3/6/23</a:t>
             </a:fld>
             <a:endParaRPr lang="en-US"/>
           </a:p>
@@ -2382,7 +2382,7 @@
           <a:p>
             <a:fld id="{DEF9554B-B9F5-F54C-9585-F8785B6DBCA8}" type="datetimeFigureOut">
               <a:rPr lang="en-US" smtClean="0"/>
-              <a:t>3/3/23</a:t>
+              <a:t>3/6/23</a:t>
             </a:fld>
             <a:endParaRPr lang="en-US"/>
           </a:p>
@@ -2670,7 +2670,7 @@
           <a:p>
             <a:fld id="{DEF9554B-B9F5-F54C-9585-F8785B6DBCA8}" type="datetimeFigureOut">
               <a:rPr lang="en-US" smtClean="0"/>
-              <a:t>3/3/23</a:t>
+              <a:t>3/6/23</a:t>
             </a:fld>
             <a:endParaRPr lang="en-US"/>
           </a:p>
@@ -2911,7 +2911,7 @@
           <a:p>
             <a:fld id="{DEF9554B-B9F5-F54C-9585-F8785B6DBCA8}" type="datetimeFigureOut">
               <a:rPr lang="en-US" smtClean="0"/>
-              <a:t>3/3/23</a:t>
+              <a:t>3/6/23</a:t>
             </a:fld>
             <a:endParaRPr lang="en-US"/>
           </a:p>
@@ -3410,7 +3410,7 @@
         </p:blipFill>
         <p:spPr>
           <a:xfrm>
-            <a:off x="4186529" y="1957569"/>
+            <a:off x="3998401" y="1981086"/>
             <a:ext cx="2097599" cy="579700"/>
           </a:xfrm>
           <a:prstGeom prst="rect">
@@ -3440,7 +3440,7 @@
         </p:blipFill>
         <p:spPr>
           <a:xfrm>
-            <a:off x="2089735" y="73838"/>
+            <a:off x="2019247" y="78868"/>
             <a:ext cx="1849727" cy="1849727"/>
           </a:xfrm>
           <a:prstGeom prst="rect">
@@ -3450,10 +3450,10 @@
       </p:pic>
       <p:pic>
         <p:nvPicPr>
-          <p:cNvPr id="6" name="Picture 5" descr="A picture containing drawing&#10;&#10;Description automatically generated">
-            <a:extLst>
-              <a:ext uri="{FF2B5EF4-FFF2-40B4-BE49-F238E27FC236}">
-                <a16:creationId xmlns:a16="http://schemas.microsoft.com/office/drawing/2014/main" id="{C4EF1D29-2FF1-4244-AB22-6C5904462609}"/>
+          <p:cNvPr id="3" name="Picture 2">
+            <a:extLst>
+              <a:ext uri="{FF2B5EF4-FFF2-40B4-BE49-F238E27FC236}">
+                <a16:creationId xmlns:a16="http://schemas.microsoft.com/office/drawing/2014/main" id="{80F0072E-D3D1-8FFF-045E-6AAC6BAE40CB}"/>
               </a:ext>
             </a:extLst>
           </p:cNvPr>
@@ -3470,8 +3470,8 @@
         </p:blipFill>
         <p:spPr>
           <a:xfrm>
-            <a:off x="4018055" y="499749"/>
-            <a:ext cx="2363511" cy="1240843"/>
+            <a:off x="1771375" y="1720316"/>
+            <a:ext cx="2097599" cy="1101240"/>
           </a:xfrm>
           <a:prstGeom prst="rect">
             <a:avLst/>
@@ -3480,10 +3480,10 @@
       </p:pic>
       <p:pic>
         <p:nvPicPr>
-          <p:cNvPr id="3" name="Picture 2">
-            <a:extLst>
-              <a:ext uri="{FF2B5EF4-FFF2-40B4-BE49-F238E27FC236}">
-                <a16:creationId xmlns:a16="http://schemas.microsoft.com/office/drawing/2014/main" id="{80F0072E-D3D1-8FFF-045E-6AAC6BAE40CB}"/>
+          <p:cNvPr id="8" name="Picture 7" descr="Shape&#10;&#10;Description automatically generated with low confidence">
+            <a:extLst>
+              <a:ext uri="{FF2B5EF4-FFF2-40B4-BE49-F238E27FC236}">
+                <a16:creationId xmlns:a16="http://schemas.microsoft.com/office/drawing/2014/main" id="{31728544-98D4-006E-B3F5-188AE131B414}"/>
               </a:ext>
             </a:extLst>
           </p:cNvPr>
@@ -3500,8 +3500,8 @@
         </p:blipFill>
         <p:spPr>
           <a:xfrm>
-            <a:off x="1880986" y="1740592"/>
-            <a:ext cx="2097599" cy="1101240"/>
+            <a:off x="4304119" y="373857"/>
+            <a:ext cx="1327515" cy="1327515"/>
           </a:xfrm>
           <a:prstGeom prst="rect">
             <a:avLst/>
@@ -3510,10 +3510,10 @@
       </p:pic>
       <p:pic>
         <p:nvPicPr>
-          <p:cNvPr id="8" name="Picture 7" descr="Shape&#10;&#10;Description automatically generated with low confidence">
-            <a:extLst>
-              <a:ext uri="{FF2B5EF4-FFF2-40B4-BE49-F238E27FC236}">
-                <a16:creationId xmlns:a16="http://schemas.microsoft.com/office/drawing/2014/main" id="{31728544-98D4-006E-B3F5-188AE131B414}"/>
+          <p:cNvPr id="13" name="Picture 12" descr="A picture containing drawing&#10;&#10;Description automatically generated">
+            <a:extLst>
+              <a:ext uri="{FF2B5EF4-FFF2-40B4-BE49-F238E27FC236}">
+                <a16:creationId xmlns:a16="http://schemas.microsoft.com/office/drawing/2014/main" id="{AC614A6A-ED40-3044-8136-E20441624A71}"/>
               </a:ext>
             </a:extLst>
           </p:cNvPr>
@@ -3530,8 +3530,8 @@
         </p:blipFill>
         <p:spPr>
           <a:xfrm>
-            <a:off x="6975682" y="1481116"/>
-            <a:ext cx="1444118" cy="1444118"/>
+            <a:off x="6419508" y="1970656"/>
+            <a:ext cx="2917917" cy="694742"/>
           </a:xfrm>
           <a:prstGeom prst="rect">
             <a:avLst/>
@@ -3540,10 +3540,10 @@
       </p:pic>
       <p:pic>
         <p:nvPicPr>
-          <p:cNvPr id="13" name="Picture 12" descr="A picture containing drawing&#10;&#10;Description automatically generated">
-            <a:extLst>
-              <a:ext uri="{FF2B5EF4-FFF2-40B4-BE49-F238E27FC236}">
-                <a16:creationId xmlns:a16="http://schemas.microsoft.com/office/drawing/2014/main" id="{AC614A6A-ED40-3044-8136-E20441624A71}"/>
+          <p:cNvPr id="4" name="Picture 3" descr="A picture containing text, clipart&#10;&#10;Description automatically generated">
+            <a:extLst>
+              <a:ext uri="{FF2B5EF4-FFF2-40B4-BE49-F238E27FC236}">
+                <a16:creationId xmlns:a16="http://schemas.microsoft.com/office/drawing/2014/main" id="{0EC4DC7C-157C-ECBA-70B3-7BBE18D230D0}"/>
               </a:ext>
             </a:extLst>
           </p:cNvPr>
@@ -3560,8 +3560,8 @@
         </p:blipFill>
         <p:spPr>
           <a:xfrm>
-            <a:off x="6096000" y="669308"/>
-            <a:ext cx="2917917" cy="694742"/>
+            <a:off x="5837147" y="695902"/>
+            <a:ext cx="3739015" cy="615661"/>
           </a:xfrm>
           <a:prstGeom prst="rect">
             <a:avLst/>

</xml_diff>